<commit_message>
Ultima atualização da apresentação
agora que apresentei n tem pq mudar
</commit_message>
<xml_diff>
--- a/_julio/ApresentaçãoTCC-Julio_Vicente_Brych.pptx
+++ b/_julio/ApresentaçãoTCC-Julio_Vicente_Brych.pptx
@@ -485,7 +485,7 @@
           <a:p>
             <a:fld id="{4DA4C31C-22C3-40E3-8117-26A998868580}" type="datetimeFigureOut">
               <a:rPr lang="pt-BR" smtClean="0"/>
-              <a:t>12/12/2023</a:t>
+              <a:t>13/12/2023</a:t>
             </a:fld>
             <a:endParaRPr lang="pt-BR"/>
           </a:p>
@@ -10538,7 +10538,7 @@
             </a:pPr>
             <a:r>
               <a:rPr lang="pt-BR" sz="2400" dirty="0"/>
-              <a:t>Tela de entrada.</a:t>
+              <a:t>Novo HUD.</a:t>
             </a:r>
           </a:p>
         </p:txBody>

</xml_diff>